<commit_message>
WebServer update and slides
</commit_message>
<xml_diff>
--- a/Collaterals/IntelMakersCourse - DriversAndLCD.pptx
+++ b/Collaterals/IntelMakersCourse - DriversAndLCD.pptx
@@ -6,10 +6,10 @@
     <p:sldMasterId id="2147483691" r:id="rId2"/>
   </p:sldMasterIdLst>
   <p:notesMasterIdLst>
-    <p:notesMasterId r:id="rId25"/>
+    <p:notesMasterId r:id="rId27"/>
   </p:notesMasterIdLst>
   <p:handoutMasterIdLst>
-    <p:handoutMasterId r:id="rId26"/>
+    <p:handoutMasterId r:id="rId28"/>
   </p:handoutMasterIdLst>
   <p:sldIdLst>
     <p:sldId id="318" r:id="rId3"/>
@@ -29,11 +29,13 @@
     <p:sldId id="385" r:id="rId17"/>
     <p:sldId id="360" r:id="rId18"/>
     <p:sldId id="386" r:id="rId19"/>
-    <p:sldId id="387" r:id="rId20"/>
-    <p:sldId id="352" r:id="rId21"/>
-    <p:sldId id="388" r:id="rId22"/>
-    <p:sldId id="389" r:id="rId23"/>
-    <p:sldId id="294" r:id="rId24"/>
+    <p:sldId id="390" r:id="rId20"/>
+    <p:sldId id="391" r:id="rId21"/>
+    <p:sldId id="387" r:id="rId22"/>
+    <p:sldId id="352" r:id="rId23"/>
+    <p:sldId id="388" r:id="rId24"/>
+    <p:sldId id="389" r:id="rId25"/>
+    <p:sldId id="294" r:id="rId26"/>
   </p:sldIdLst>
   <p:sldSz cx="9144000" cy="5143500" type="screen16x9"/>
   <p:notesSz cx="6858000" cy="9144000"/>
@@ -263,7 +265,7 @@
                 <a:latin typeface="Intel Clear"/>
               </a:rPr>
               <a:pPr/>
-              <a:t>12/11/2024</a:t>
+              <a:t>12/23/2024</a:t>
             </a:fld>
             <a:endParaRPr lang="en-US" dirty="0">
               <a:latin typeface="Intel Clear"/>
@@ -443,7 +445,7 @@
             <a:fld id="{ED7FC5FE-6F0D-D34A-8EE6-C95B4F5F4DC8}" type="datetimeFigureOut">
               <a:rPr lang="en-US" smtClean="0"/>
               <a:pPr/>
-              <a:t>12/11/2024</a:t>
+              <a:t>12/23/2024</a:t>
             </a:fld>
             <a:endParaRPr lang="en-US" dirty="0"/>
           </a:p>
@@ -985,7 +987,7 @@
           <a:noFill/>
           <a:extLst>
             <a:ext uri="{909E8E84-426E-40dd-AFC4-6F175D3DCCD1}">
-              <a14:hiddenFill xmlns:a14="http://schemas.microsoft.com/office/drawing/2010/main" xmlns="">
+              <a14:hiddenFill xmlns="" xmlns:a14="http://schemas.microsoft.com/office/drawing/2010/main">
                 <a:solidFill>
                   <a:srgbClr val="FFFFFF"/>
                 </a:solidFill>
@@ -3859,7 +3861,7 @@
           <a:noFill/>
           <a:extLst>
             <a:ext uri="{909E8E84-426E-40dd-AFC4-6F175D3DCCD1}">
-              <a14:hiddenFill xmlns:a14="http://schemas.microsoft.com/office/drawing/2010/main" xmlns="">
+              <a14:hiddenFill xmlns="" xmlns:a14="http://schemas.microsoft.com/office/drawing/2010/main">
                 <a:solidFill>
                   <a:srgbClr val="FFFFFF"/>
                 </a:solidFill>
@@ -4028,7 +4030,7 @@
           <a:noFill/>
           <a:extLst>
             <a:ext uri="{909E8E84-426E-40dd-AFC4-6F175D3DCCD1}">
-              <a14:hiddenFill xmlns:a14="http://schemas.microsoft.com/office/drawing/2010/main" xmlns="">
+              <a14:hiddenFill xmlns="" xmlns:a14="http://schemas.microsoft.com/office/drawing/2010/main">
                 <a:solidFill>
                   <a:srgbClr val="FFFFFF"/>
                 </a:solidFill>
@@ -4423,7 +4425,7 @@
           <a:noFill/>
           <a:extLst>
             <a:ext uri="{909E8E84-426E-40dd-AFC4-6F175D3DCCD1}">
-              <a14:hiddenFill xmlns:a14="http://schemas.microsoft.com/office/drawing/2010/main" xmlns="">
+              <a14:hiddenFill xmlns="" xmlns:a14="http://schemas.microsoft.com/office/drawing/2010/main">
                 <a:solidFill>
                   <a:srgbClr val="FFFFFF"/>
                 </a:solidFill>
@@ -4726,7 +4728,7 @@
           <a:noFill/>
           <a:extLst>
             <a:ext uri="{909E8E84-426E-40dd-AFC4-6F175D3DCCD1}">
-              <a14:hiddenFill xmlns:a14="http://schemas.microsoft.com/office/drawing/2010/main" xmlns="">
+              <a14:hiddenFill xmlns="" xmlns:a14="http://schemas.microsoft.com/office/drawing/2010/main">
                 <a:solidFill>
                   <a:srgbClr val="FFFFFF"/>
                 </a:solidFill>
@@ -5062,7 +5064,7 @@
           <a:noFill/>
           <a:extLst>
             <a:ext uri="{909E8E84-426E-40dd-AFC4-6F175D3DCCD1}">
-              <a14:hiddenFill xmlns:a14="http://schemas.microsoft.com/office/drawing/2010/main" xmlns="">
+              <a14:hiddenFill xmlns="" xmlns:a14="http://schemas.microsoft.com/office/drawing/2010/main">
                 <a:solidFill>
                   <a:srgbClr val="FFFFFF"/>
                 </a:solidFill>
@@ -9278,7 +9280,7 @@
           <a:noFill/>
           <a:extLst>
             <a:ext uri="{909E8E84-426E-40dd-AFC4-6F175D3DCCD1}">
-              <a14:hiddenFill xmlns:a14="http://schemas.microsoft.com/office/drawing/2010/main" xmlns="">
+              <a14:hiddenFill xmlns="" xmlns:a14="http://schemas.microsoft.com/office/drawing/2010/main">
                 <a:solidFill>
                   <a:srgbClr val="FFFFFF"/>
                 </a:solidFill>
@@ -9522,7 +9524,7 @@
           <a:noFill/>
           <a:extLst>
             <a:ext uri="{909E8E84-426E-40dd-AFC4-6F175D3DCCD1}">
-              <a14:hiddenFill xmlns:a14="http://schemas.microsoft.com/office/drawing/2010/main" xmlns="">
+              <a14:hiddenFill xmlns="" xmlns:a14="http://schemas.microsoft.com/office/drawing/2010/main">
                 <a:solidFill>
                   <a:srgbClr val="FFFFFF"/>
                 </a:solidFill>
@@ -10947,7 +10949,7 @@
           <a:noFill/>
           <a:extLst>
             <a:ext uri="{909E8E84-426E-40dd-AFC4-6F175D3DCCD1}">
-              <a14:hiddenFill xmlns:a14="http://schemas.microsoft.com/office/drawing/2010/main" xmlns="">
+              <a14:hiddenFill xmlns="" xmlns:a14="http://schemas.microsoft.com/office/drawing/2010/main">
                 <a:solidFill>
                   <a:srgbClr val="FFFFFF"/>
                 </a:solidFill>
@@ -11564,7 +11566,7 @@
           <a:noFill/>
           <a:extLst>
             <a:ext uri="{909E8E84-426E-40dd-AFC4-6F175D3DCCD1}">
-              <a14:hiddenFill xmlns:a14="http://schemas.microsoft.com/office/drawing/2010/main" xmlns="">
+              <a14:hiddenFill xmlns="" xmlns:a14="http://schemas.microsoft.com/office/drawing/2010/main">
                 <a:solidFill>
                   <a:srgbClr val="FFFFFF"/>
                 </a:solidFill>
@@ -15728,7 +15730,7 @@
           <p:cNvPr id="2" name="Slide Number Placeholder 1">
             <a:extLst>
               <a:ext uri="{FF2B5EF4-FFF2-40B4-BE49-F238E27FC236}">
-                <a16:creationId xmlns:a16="http://schemas.microsoft.com/office/drawing/2014/main" id="{5FB20A19-01DC-A995-4040-5FAC1B2667EE}"/>
+                <a16:creationId xmlns:a16="http://schemas.microsoft.com/office/drawing/2014/main" id="{6D6381D6-FDAF-8615-CBC3-760BA3566AA0}"/>
               </a:ext>
             </a:extLst>
           </p:cNvPr>
@@ -15758,7 +15760,7 @@
           <p:cNvPr id="3" name="Title 2">
             <a:extLst>
               <a:ext uri="{FF2B5EF4-FFF2-40B4-BE49-F238E27FC236}">
-                <a16:creationId xmlns:a16="http://schemas.microsoft.com/office/drawing/2014/main" id="{B27E8CC4-600F-1848-95A7-91A82AC0BEC7}"/>
+                <a16:creationId xmlns:a16="http://schemas.microsoft.com/office/drawing/2014/main" id="{582E3F4E-AE97-CE9A-20F9-6B10A7BF562F}"/>
               </a:ext>
             </a:extLst>
           </p:cNvPr>
@@ -15771,8 +15773,8 @@
         </p:nvSpPr>
         <p:spPr>
           <a:xfrm>
-            <a:off x="454025" y="45269"/>
-            <a:ext cx="8229600" cy="353140"/>
+            <a:off x="455613" y="308848"/>
+            <a:ext cx="8229600" cy="367427"/>
           </a:xfrm>
         </p:spPr>
         <p:txBody>
@@ -15781,7 +15783,7 @@
           <a:p>
             <a:r>
               <a:rPr lang="en-US" dirty="0"/>
-              <a:t>Hands on:</a:t>
+              <a:t>Creating and using custom fonts</a:t>
             </a:r>
             <a:endParaRPr lang="en-IL" dirty="0"/>
           </a:p>
@@ -15792,7 +15794,7 @@
           <p:cNvPr id="4" name="Content Placeholder 3">
             <a:extLst>
               <a:ext uri="{FF2B5EF4-FFF2-40B4-BE49-F238E27FC236}">
-                <a16:creationId xmlns:a16="http://schemas.microsoft.com/office/drawing/2014/main" id="{4FCC30F8-65D4-6E6D-CE2C-D3203DB3470A}"/>
+                <a16:creationId xmlns:a16="http://schemas.microsoft.com/office/drawing/2014/main" id="{805EC587-6911-8395-287C-6104BB23FB71}"/>
               </a:ext>
             </a:extLst>
           </p:cNvPr>
@@ -15805,163 +15807,99 @@
         </p:nvSpPr>
         <p:spPr>
           <a:xfrm>
-            <a:off x="455613" y="464456"/>
-            <a:ext cx="8228012" cy="4240894"/>
+            <a:off x="455613" y="676275"/>
+            <a:ext cx="8228012" cy="3952875"/>
           </a:xfrm>
         </p:spPr>
         <p:txBody>
           <a:bodyPr/>
           <a:lstStyle/>
           <a:p>
-            <a:pPr marL="342900" indent="-342900">
-              <a:buFont typeface="+mj-lt"/>
-              <a:buAutoNum type="arabicPeriod"/>
+            <a:pPr marL="285750" indent="-285750">
+              <a:buFont typeface="Arial" panose="020B0604020202020204" pitchFamily="34" charset="0"/>
+              <a:buChar char="•"/>
             </a:pPr>
             <a:r>
               <a:rPr lang="en-US" dirty="0"/>
-              <a:t>Create a new project named: </a:t>
-            </a:r>
-            <a:r>
-              <a:rPr lang="en-US" b="1" dirty="0"/>
-              <a:t>ESP32_S3_MP_BasicProject</a:t>
-            </a:r>
-          </a:p>
-          <a:p>
-            <a:pPr marL="342900" indent="-342900">
-              <a:buFont typeface="+mj-lt"/>
-              <a:buAutoNum type="arabicPeriod"/>
-            </a:pPr>
-            <a:r>
-              <a:rPr lang="en-US" dirty="0"/>
-              <a:t>Prepare and SD card formatted in FAT32 </a:t>
-            </a:r>
-          </a:p>
-          <a:p>
-            <a:pPr marL="342900" indent="-342900">
-              <a:buFont typeface="+mj-lt"/>
-              <a:buAutoNum type="arabicPeriod"/>
-            </a:pPr>
-            <a:r>
-              <a:rPr lang="en-US" dirty="0"/>
-              <a:t>Copy the </a:t>
-            </a:r>
-            <a:r>
-              <a:rPr lang="en-US" dirty="0" err="1"/>
-              <a:t>SD_Card</a:t>
-            </a:r>
-            <a:r>
-              <a:rPr lang="en-US" dirty="0"/>
-              <a:t> folder content into your SD card from: </a:t>
+              <a:t>Download the processing tool: (</a:t>
             </a:r>
             <a:r>
               <a:rPr lang="en-US" dirty="0">
                 <a:hlinkClick r:id="rId2"/>
               </a:rPr>
-              <a:t>https://drive.google.com/drive/folders/1zq6xBnafNOxvXa-MHr8R3TDQCG0Yzd6z?usp=sharing</a:t>
-            </a:r>
-            <a:endParaRPr lang="en-US" dirty="0"/>
-          </a:p>
-          <a:p>
-            <a:pPr marL="342900" indent="-342900">
-              <a:buFont typeface="+mj-lt"/>
-              <a:buAutoNum type="arabicPeriod"/>
+              <a:t>https://processing.org/download</a:t>
+            </a:r>
+            <a:r>
+              <a:rPr lang="en-US" dirty="0"/>
+              <a:t>)</a:t>
+            </a:r>
+          </a:p>
+          <a:p>
+            <a:pPr marL="285750" indent="-285750">
+              <a:buFont typeface="Arial" panose="020B0604020202020204" pitchFamily="34" charset="0"/>
+              <a:buChar char="•"/>
             </a:pPr>
             <a:r>
               <a:rPr lang="en-US" dirty="0"/>
-              <a:t>Download the </a:t>
-            </a:r>
-            <a:r>
-              <a:rPr lang="en-US" dirty="0" err="1"/>
-              <a:t>TFT_eSPI</a:t>
-            </a:r>
-            <a:r>
-              <a:rPr lang="en-US" dirty="0"/>
-              <a:t> library from: </a:t>
-            </a:r>
-            <a:r>
-              <a:rPr lang="en-US" dirty="0">
-                <a:hlinkClick r:id="rId3"/>
-              </a:rPr>
-              <a:t>https://github.com/Bodmer/TFT_eSPI</a:t>
-            </a:r>
-            <a:endParaRPr lang="en-US" dirty="0"/>
-          </a:p>
-          <a:p>
-            <a:pPr marL="342900" indent="-342900">
-              <a:buFont typeface="+mj-lt"/>
-              <a:buAutoNum type="arabicPeriod"/>
+              <a:t>Create a new sketch:</a:t>
+            </a:r>
+          </a:p>
+          <a:p>
+            <a:pPr marL="285750" indent="-285750">
+              <a:buFont typeface="Arial" panose="020B0604020202020204" pitchFamily="34" charset="0"/>
+              <a:buChar char="•"/>
             </a:pPr>
             <a:r>
               <a:rPr lang="en-US" dirty="0"/>
-              <a:t>Copy from the drivers folder in the course GIT the PNG library into Arduino’s libraries folder</a:t>
-            </a:r>
-          </a:p>
-          <a:p>
-            <a:pPr marL="342900" indent="-342900">
-              <a:buFont typeface="+mj-lt"/>
-              <a:buAutoNum type="arabicPeriod"/>
-            </a:pPr>
-            <a:r>
-              <a:rPr lang="en-US" dirty="0"/>
-              <a:t>Copy the Setup300_MakersMiniPlatform_S3.h into the user setups folder within the </a:t>
-            </a:r>
-            <a:r>
-              <a:rPr lang="en-US" dirty="0" err="1"/>
-              <a:t>TFT_eSPI</a:t>
-            </a:r>
-            <a:r>
-              <a:rPr lang="en-US" dirty="0"/>
-              <a:t> library </a:t>
-            </a:r>
-          </a:p>
-          <a:p>
-            <a:pPr marL="342900" indent="-342900">
-              <a:buFont typeface="+mj-lt"/>
-              <a:buAutoNum type="arabicPeriod"/>
-            </a:pPr>
-            <a:r>
-              <a:rPr lang="en-US" dirty="0"/>
-              <a:t>From </a:t>
-            </a:r>
-            <a:r>
-              <a:rPr lang="en-US" b="1" dirty="0" err="1"/>
-              <a:t>CodeExamples</a:t>
-            </a:r>
-            <a:r>
-              <a:rPr lang="en-US" b="1" dirty="0"/>
-              <a:t>\</a:t>
-            </a:r>
-            <a:r>
-              <a:rPr lang="en-US" b="1" dirty="0" err="1"/>
-              <a:t>BasicProject</a:t>
-            </a:r>
-            <a:r>
-              <a:rPr lang="en-US" dirty="0"/>
-              <a:t> folder Copy the code from ESP32_S3_MP_BasicProject.ino onto your project</a:t>
-            </a:r>
-          </a:p>
-          <a:p>
-            <a:pPr marL="342900" indent="-342900">
-              <a:buFont typeface="+mj-lt"/>
-              <a:buAutoNum type="arabicPeriod"/>
+              <a:t>Within the sketch: </a:t>
+            </a:r>
+          </a:p>
+          <a:p>
+            <a:pPr marL="285750" indent="-285750">
+              <a:buFont typeface="Arial" panose="020B0604020202020204" pitchFamily="34" charset="0"/>
+              <a:buChar char="•"/>
             </a:pPr>
             <a:endParaRPr lang="en-US" dirty="0"/>
           </a:p>
           <a:p>
-            <a:pPr marL="342900" indent="-342900">
-              <a:buFont typeface="+mj-lt"/>
-              <a:buAutoNum type="arabicPeriod"/>
+            <a:pPr marL="285750" indent="-285750">
+              <a:buFont typeface="Arial" panose="020B0604020202020204" pitchFamily="34" charset="0"/>
+              <a:buChar char="•"/>
             </a:pPr>
             <a:endParaRPr lang="en-US" dirty="0"/>
+          </a:p>
+          <a:p>
+            <a:pPr marL="285750" indent="-285750">
+              <a:buFont typeface="Arial" panose="020B0604020202020204" pitchFamily="34" charset="0"/>
+              <a:buChar char="•"/>
+            </a:pPr>
+            <a:endParaRPr lang="en-US" dirty="0"/>
+          </a:p>
+          <a:p>
+            <a:pPr marL="285750" indent="-285750">
+              <a:buFont typeface="Arial" panose="020B0604020202020204" pitchFamily="34" charset="0"/>
+              <a:buChar char="•"/>
+            </a:pPr>
+            <a:r>
+              <a:rPr lang="en-US" dirty="0"/>
+              <a:t>Check the next slide:</a:t>
+            </a:r>
+          </a:p>
+          <a:p>
+            <a:pPr marL="285750" indent="-285750">
+              <a:buFont typeface="Arial" panose="020B0604020202020204" pitchFamily="34" charset="0"/>
+              <a:buChar char="•"/>
+            </a:pPr>
+            <a:endParaRPr lang="en-IL" dirty="0"/>
           </a:p>
         </p:txBody>
       </p:sp>
       <p:pic>
         <p:nvPicPr>
-          <p:cNvPr id="6" name="Picture 5">
+          <p:cNvPr id="9" name="Picture 8">
             <a:extLst>
               <a:ext uri="{FF2B5EF4-FFF2-40B4-BE49-F238E27FC236}">
-                <a16:creationId xmlns:a16="http://schemas.microsoft.com/office/drawing/2014/main" id="{73258B2E-60DC-9273-56E2-F8D40A22DF1C}"/>
+                <a16:creationId xmlns:a16="http://schemas.microsoft.com/office/drawing/2014/main" id="{302D5AF9-9059-32CA-43FF-D03038967F0A}"/>
               </a:ext>
             </a:extLst>
           </p:cNvPr>
@@ -15971,15 +15909,15 @@
           <p:nvPr/>
         </p:nvPicPr>
         <p:blipFill>
-          <a:blip r:embed="rId4"/>
+          <a:blip r:embed="rId3"/>
           <a:stretch>
             <a:fillRect/>
           </a:stretch>
         </p:blipFill>
         <p:spPr>
           <a:xfrm>
-            <a:off x="6491286" y="398409"/>
-            <a:ext cx="2415061" cy="1784160"/>
+            <a:off x="2919219" y="1093399"/>
+            <a:ext cx="4458086" cy="1623201"/>
           </a:xfrm>
           <a:prstGeom prst="rect">
             <a:avLst/>
@@ -15989,7 +15927,7 @@
     </p:spTree>
     <p:extLst>
       <p:ext uri="{BB962C8B-B14F-4D97-AF65-F5344CB8AC3E}">
-        <p14:creationId xmlns:p14="http://schemas.microsoft.com/office/powerpoint/2010/main" val="1407571409"/>
+        <p14:creationId xmlns:p14="http://schemas.microsoft.com/office/powerpoint/2010/main" val="4023330442"/>
       </p:ext>
     </p:extLst>
   </p:cSld>
@@ -16033,7 +15971,7 @@
           <p:cNvPr id="2" name="Slide Number Placeholder 1">
             <a:extLst>
               <a:ext uri="{FF2B5EF4-FFF2-40B4-BE49-F238E27FC236}">
-                <a16:creationId xmlns:a16="http://schemas.microsoft.com/office/drawing/2014/main" id="{6DDC3DC2-E1E0-4ADC-99B4-EC41F3605C53}"/>
+                <a16:creationId xmlns:a16="http://schemas.microsoft.com/office/drawing/2014/main" id="{92B03F4C-AB8A-A5A1-9C76-885A9EBB2246}"/>
               </a:ext>
             </a:extLst>
           </p:cNvPr>
@@ -16060,43 +15998,10 @@
       </p:sp>
       <p:sp>
         <p:nvSpPr>
-          <p:cNvPr id="3" name="Title 2">
-            <a:extLst>
-              <a:ext uri="{FF2B5EF4-FFF2-40B4-BE49-F238E27FC236}">
-                <a16:creationId xmlns:a16="http://schemas.microsoft.com/office/drawing/2014/main" id="{D9D845F4-3243-4A3A-BD6F-1EFC4D2546A2}"/>
-              </a:ext>
-            </a:extLst>
-          </p:cNvPr>
-          <p:cNvSpPr>
-            <a:spLocks noGrp="1"/>
-          </p:cNvSpPr>
-          <p:nvPr>
-            <p:ph type="title"/>
-          </p:nvPr>
-        </p:nvSpPr>
-        <p:spPr>
-          <a:xfrm>
-            <a:off x="455613" y="308848"/>
-            <a:ext cx="8229600" cy="342181"/>
-          </a:xfrm>
-        </p:spPr>
-        <p:txBody>
-          <a:bodyPr/>
-          <a:lstStyle/>
-          <a:p>
-            <a:r>
-              <a:rPr lang="en-US" dirty="0"/>
-              <a:t>How to use image files in our code</a:t>
-            </a:r>
-          </a:p>
-        </p:txBody>
-      </p:sp>
-      <p:sp>
-        <p:nvSpPr>
           <p:cNvPr id="4" name="Content Placeholder 3">
             <a:extLst>
               <a:ext uri="{FF2B5EF4-FFF2-40B4-BE49-F238E27FC236}">
-                <a16:creationId xmlns:a16="http://schemas.microsoft.com/office/drawing/2014/main" id="{2D1D1002-C2B2-4C45-AA39-B9812A6839A7}"/>
+                <a16:creationId xmlns:a16="http://schemas.microsoft.com/office/drawing/2014/main" id="{C01BA01C-C2BF-3514-5EBE-83569B7E0B8A}"/>
               </a:ext>
             </a:extLst>
           </p:cNvPr>
@@ -16109,8 +16014,8 @@
         </p:nvSpPr>
         <p:spPr>
           <a:xfrm>
-            <a:off x="455613" y="742765"/>
-            <a:ext cx="8228012" cy="3778927"/>
+            <a:off x="455612" y="238125"/>
+            <a:ext cx="3654425" cy="4391025"/>
           </a:xfrm>
         </p:spPr>
         <p:txBody>
@@ -16118,62 +16023,181 @@
           <a:lstStyle/>
           <a:p>
             <a:pPr marL="285750" indent="-285750">
-              <a:spcBef>
-                <a:spcPts val="600"/>
-              </a:spcBef>
               <a:buFont typeface="Arial" panose="020B0604020202020204" pitchFamily="34" charset="0"/>
               <a:buChar char="•"/>
             </a:pPr>
             <a:r>
-              <a:rPr lang="en-US" sz="1600" dirty="0"/>
-              <a:t>Download or create PNG files</a:t>
+              <a:rPr lang="en-US" dirty="0"/>
+              <a:t>Choose your font and size</a:t>
             </a:r>
           </a:p>
           <a:p>
             <a:pPr marL="285750" indent="-285750">
-              <a:spcBef>
-                <a:spcPts val="600"/>
-              </a:spcBef>
               <a:buFont typeface="Arial" panose="020B0604020202020204" pitchFamily="34" charset="0"/>
               <a:buChar char="•"/>
             </a:pPr>
             <a:r>
-              <a:rPr lang="en-US" sz="1600" dirty="0"/>
-              <a:t>Load them into the SD card</a:t>
+              <a:rPr lang="en-US" dirty="0"/>
+              <a:t>Follow the steps and choose size</a:t>
             </a:r>
           </a:p>
           <a:p>
             <a:pPr marL="285750" indent="-285750">
-              <a:spcBef>
-                <a:spcPts val="600"/>
-              </a:spcBef>
               <a:buFont typeface="Arial" panose="020B0604020202020204" pitchFamily="34" charset="0"/>
               <a:buChar char="•"/>
             </a:pPr>
             <a:r>
-              <a:rPr lang="en-US" sz="1600" dirty="0"/>
-              <a:t>Load them into memory and then into the LCD or sprite</a:t>
+              <a:rPr lang="en-US" dirty="0"/>
+              <a:t>The VLW file will be places in the sketch’s folder</a:t>
             </a:r>
           </a:p>
           <a:p>
             <a:pPr marL="285750" indent="-285750">
-              <a:spcBef>
-                <a:spcPts val="600"/>
-              </a:spcBef>
               <a:buFont typeface="Arial" panose="020B0604020202020204" pitchFamily="34" charset="0"/>
               <a:buChar char="•"/>
             </a:pPr>
             <a:r>
-              <a:rPr lang="en-US" sz="1600" dirty="0"/>
-              <a:t>See the code example</a:t>
-            </a:r>
+              <a:rPr lang="en-US" dirty="0"/>
+              <a:t>Load the VLW onto the SPIFFS file system</a:t>
+            </a:r>
+          </a:p>
+          <a:p>
+            <a:pPr marL="285750" indent="-285750">
+              <a:buFont typeface="Arial" panose="020B0604020202020204" pitchFamily="34" charset="0"/>
+              <a:buChar char="•"/>
+            </a:pPr>
+            <a:r>
+              <a:rPr lang="en-US" dirty="0"/>
+              <a:t>Usage in the code:</a:t>
+            </a:r>
+          </a:p>
+          <a:p>
+            <a:pPr marL="285750" indent="-285750">
+              <a:buFont typeface="Arial" panose="020B0604020202020204" pitchFamily="34" charset="0"/>
+              <a:buChar char="•"/>
+            </a:pPr>
+            <a:endParaRPr lang="en-US" dirty="0"/>
+          </a:p>
+          <a:p>
+            <a:pPr marL="285750" indent="-285750">
+              <a:buFont typeface="Arial" panose="020B0604020202020204" pitchFamily="34" charset="0"/>
+              <a:buChar char="•"/>
+            </a:pPr>
+            <a:endParaRPr lang="en-US" dirty="0"/>
+          </a:p>
+          <a:p>
+            <a:pPr marL="285750" indent="-285750">
+              <a:buFont typeface="Arial" panose="020B0604020202020204" pitchFamily="34" charset="0"/>
+              <a:buChar char="•"/>
+            </a:pPr>
+            <a:endParaRPr lang="en-US" dirty="0"/>
+          </a:p>
+          <a:p>
+            <a:pPr marL="285750" indent="-285750">
+              <a:buFont typeface="Arial" panose="020B0604020202020204" pitchFamily="34" charset="0"/>
+              <a:buChar char="•"/>
+            </a:pPr>
+            <a:r>
+              <a:rPr lang="en-US" dirty="0"/>
+              <a:t>Great site for free fonts:</a:t>
+            </a:r>
+            <a:r>
+              <a:rPr lang="en-US" sz="1800" dirty="0">
+                <a:effectLst/>
+                <a:latin typeface="Calibri" panose="020F0502020204030204" pitchFamily="34" charset="0"/>
+              </a:rPr>
+              <a:t> </a:t>
+            </a:r>
+            <a:r>
+              <a:rPr lang="en-US" sz="1800" dirty="0">
+                <a:effectLst/>
+                <a:latin typeface="Calibri" panose="020F0502020204030204" pitchFamily="34" charset="0"/>
+                <a:hlinkClick r:id="rId2"/>
+              </a:rPr>
+              <a:t>https://www.dafont.com/</a:t>
+            </a:r>
+            <a:endParaRPr lang="en-US" dirty="0"/>
+          </a:p>
+          <a:p>
+            <a:pPr marL="285750" indent="-285750">
+              <a:buFont typeface="Arial" panose="020B0604020202020204" pitchFamily="34" charset="0"/>
+              <a:buChar char="•"/>
+            </a:pPr>
+            <a:endParaRPr lang="en-US" dirty="0"/>
+          </a:p>
+          <a:p>
+            <a:pPr marL="285750" indent="-285750">
+              <a:buFont typeface="Arial" panose="020B0604020202020204" pitchFamily="34" charset="0"/>
+              <a:buChar char="•"/>
+            </a:pPr>
+            <a:endParaRPr lang="en-IL" dirty="0"/>
           </a:p>
         </p:txBody>
       </p:sp>
+      <p:pic>
+        <p:nvPicPr>
+          <p:cNvPr id="6" name="Picture 5">
+            <a:extLst>
+              <a:ext uri="{FF2B5EF4-FFF2-40B4-BE49-F238E27FC236}">
+                <a16:creationId xmlns:a16="http://schemas.microsoft.com/office/drawing/2014/main" id="{4478A78B-9F0E-9B89-6EE6-37B12A619FB1}"/>
+              </a:ext>
+            </a:extLst>
+          </p:cNvPr>
+          <p:cNvPicPr>
+            <a:picLocks noChangeAspect="1"/>
+          </p:cNvPicPr>
+          <p:nvPr/>
+        </p:nvPicPr>
+        <p:blipFill>
+          <a:blip r:embed="rId3"/>
+          <a:stretch>
+            <a:fillRect/>
+          </a:stretch>
+        </p:blipFill>
+        <p:spPr>
+          <a:xfrm>
+            <a:off x="4157661" y="154008"/>
+            <a:ext cx="4933595" cy="4189392"/>
+          </a:xfrm>
+          <a:prstGeom prst="rect">
+            <a:avLst/>
+          </a:prstGeom>
+        </p:spPr>
+      </p:pic>
+      <p:pic>
+        <p:nvPicPr>
+          <p:cNvPr id="8" name="Picture 7">
+            <a:extLst>
+              <a:ext uri="{FF2B5EF4-FFF2-40B4-BE49-F238E27FC236}">
+                <a16:creationId xmlns:a16="http://schemas.microsoft.com/office/drawing/2014/main" id="{09113DDA-5E21-C1E7-DDCA-622A9DDF3956}"/>
+              </a:ext>
+            </a:extLst>
+          </p:cNvPr>
+          <p:cNvPicPr>
+            <a:picLocks noChangeAspect="1"/>
+          </p:cNvPicPr>
+          <p:nvPr/>
+        </p:nvPicPr>
+        <p:blipFill>
+          <a:blip r:embed="rId4"/>
+          <a:stretch>
+            <a:fillRect/>
+          </a:stretch>
+        </p:blipFill>
+        <p:spPr>
+          <a:xfrm>
+            <a:off x="123452" y="2867024"/>
+            <a:ext cx="4010397" cy="1219620"/>
+          </a:xfrm>
+          <a:prstGeom prst="rect">
+            <a:avLst/>
+          </a:prstGeom>
+        </p:spPr>
+      </p:pic>
     </p:spTree>
     <p:extLst>
       <p:ext uri="{BB962C8B-B14F-4D97-AF65-F5344CB8AC3E}">
-        <p14:creationId xmlns:p14="http://schemas.microsoft.com/office/powerpoint/2010/main" val="2989656303"/>
+        <p14:creationId xmlns:p14="http://schemas.microsoft.com/office/powerpoint/2010/main" val="3305914543"/>
       </p:ext>
     </p:extLst>
   </p:cSld>
@@ -16259,7 +16283,7 @@
           <p:cNvPr id="2" name="Slide Number Placeholder 1">
             <a:extLst>
               <a:ext uri="{FF2B5EF4-FFF2-40B4-BE49-F238E27FC236}">
-                <a16:creationId xmlns:a16="http://schemas.microsoft.com/office/drawing/2014/main" id="{46E83D63-2998-4A61-C389-8701E936CDAF}"/>
+                <a16:creationId xmlns:a16="http://schemas.microsoft.com/office/drawing/2014/main" id="{5FB20A19-01DC-A995-4040-5FAC1B2667EE}"/>
               </a:ext>
             </a:extLst>
           </p:cNvPr>
@@ -16289,7 +16313,7 @@
           <p:cNvPr id="3" name="Title 2">
             <a:extLst>
               <a:ext uri="{FF2B5EF4-FFF2-40B4-BE49-F238E27FC236}">
-                <a16:creationId xmlns:a16="http://schemas.microsoft.com/office/drawing/2014/main" id="{B6F9068D-B47B-354C-EF16-74C8B1C0C821}"/>
+                <a16:creationId xmlns:a16="http://schemas.microsoft.com/office/drawing/2014/main" id="{B27E8CC4-600F-1848-95A7-91A82AC0BEC7}"/>
               </a:ext>
             </a:extLst>
           </p:cNvPr>
@@ -16302,8 +16326,8 @@
         </p:nvSpPr>
         <p:spPr>
           <a:xfrm>
-            <a:off x="455613" y="308848"/>
-            <a:ext cx="8229600" cy="362665"/>
+            <a:off x="454025" y="45269"/>
+            <a:ext cx="8229600" cy="353140"/>
           </a:xfrm>
         </p:spPr>
         <p:txBody>
@@ -16312,7 +16336,7 @@
           <a:p>
             <a:r>
               <a:rPr lang="en-US" dirty="0"/>
-              <a:t>Extras:</a:t>
+              <a:t>Hands on:</a:t>
             </a:r>
             <a:endParaRPr lang="en-IL" dirty="0"/>
           </a:p>
@@ -16323,7 +16347,7 @@
           <p:cNvPr id="4" name="Content Placeholder 3">
             <a:extLst>
               <a:ext uri="{FF2B5EF4-FFF2-40B4-BE49-F238E27FC236}">
-                <a16:creationId xmlns:a16="http://schemas.microsoft.com/office/drawing/2014/main" id="{8B6446D1-2A03-DF68-1DF4-D9D0C090C5DF}"/>
+                <a16:creationId xmlns:a16="http://schemas.microsoft.com/office/drawing/2014/main" id="{4FCC30F8-65D4-6E6D-CE2C-D3203DB3470A}"/>
               </a:ext>
             </a:extLst>
           </p:cNvPr>
@@ -16336,33 +16360,154 @@
         </p:nvSpPr>
         <p:spPr>
           <a:xfrm>
-            <a:off x="455613" y="671513"/>
-            <a:ext cx="8228012" cy="3957637"/>
+            <a:off x="455613" y="464456"/>
+            <a:ext cx="8228012" cy="4240894"/>
           </a:xfrm>
         </p:spPr>
         <p:txBody>
           <a:bodyPr/>
           <a:lstStyle/>
           <a:p>
-            <a:pPr marL="285750" indent="-285750">
-              <a:buFont typeface="Arial" panose="020B0604020202020204" pitchFamily="34" charset="0"/>
-              <a:buChar char="•"/>
+            <a:pPr marL="342900" indent="-342900">
+              <a:buFont typeface="+mj-lt"/>
+              <a:buAutoNum type="arabicPeriod"/>
             </a:pPr>
             <a:r>
               <a:rPr lang="en-US" dirty="0"/>
-              <a:t>How to load bin directly using web interface: </a:t>
-            </a:r>
-          </a:p>
-          <a:p>
-            <a:pPr marL="511175" lvl="1" indent="-285750">
-              <a:buFont typeface="Arial" panose="020B0604020202020204" pitchFamily="34" charset="0"/>
-              <a:buChar char="•"/>
+              <a:t>Create a new project named: </a:t>
+            </a:r>
+            <a:r>
+              <a:rPr lang="en-US" b="1" dirty="0"/>
+              <a:t>ESP32_S3_MP_BasicProject</a:t>
+            </a:r>
+          </a:p>
+          <a:p>
+            <a:pPr marL="342900" indent="-342900">
+              <a:buFont typeface="+mj-lt"/>
+              <a:buAutoNum type="arabicPeriod"/>
             </a:pPr>
             <a:r>
               <a:rPr lang="en-US" dirty="0"/>
-              <a:t>https://espressif.github.io/esptool-js/</a:t>
-            </a:r>
-            <a:endParaRPr lang="en-IL" dirty="0"/>
+              <a:t>Prepare and SD card formatted in FAT32 </a:t>
+            </a:r>
+          </a:p>
+          <a:p>
+            <a:pPr marL="342900" indent="-342900">
+              <a:buFont typeface="+mj-lt"/>
+              <a:buAutoNum type="arabicPeriod"/>
+            </a:pPr>
+            <a:r>
+              <a:rPr lang="en-US" dirty="0"/>
+              <a:t>Copy the </a:t>
+            </a:r>
+            <a:r>
+              <a:rPr lang="en-US" dirty="0" err="1"/>
+              <a:t>SD_Card</a:t>
+            </a:r>
+            <a:r>
+              <a:rPr lang="en-US" dirty="0"/>
+              <a:t> folder content into your SD card from: </a:t>
+            </a:r>
+            <a:r>
+              <a:rPr lang="en-US" dirty="0">
+                <a:hlinkClick r:id="rId2"/>
+              </a:rPr>
+              <a:t>https://drive.google.com/drive/folders/1zq6xBnafNOxvXa-MHr8R3TDQCG0Yzd6z?usp=sharing</a:t>
+            </a:r>
+            <a:endParaRPr lang="en-US" dirty="0"/>
+          </a:p>
+          <a:p>
+            <a:pPr marL="342900" indent="-342900">
+              <a:buFont typeface="+mj-lt"/>
+              <a:buAutoNum type="arabicPeriod"/>
+            </a:pPr>
+            <a:r>
+              <a:rPr lang="en-US" dirty="0"/>
+              <a:t>Download the </a:t>
+            </a:r>
+            <a:r>
+              <a:rPr lang="en-US" dirty="0" err="1"/>
+              <a:t>TFT_eSPI</a:t>
+            </a:r>
+            <a:r>
+              <a:rPr lang="en-US" dirty="0"/>
+              <a:t> library from: </a:t>
+            </a:r>
+            <a:r>
+              <a:rPr lang="en-US" dirty="0">
+                <a:hlinkClick r:id="rId3"/>
+              </a:rPr>
+              <a:t>https://github.com/Bodmer/TFT_eSPI</a:t>
+            </a:r>
+            <a:endParaRPr lang="en-US" dirty="0"/>
+          </a:p>
+          <a:p>
+            <a:pPr marL="342900" indent="-342900">
+              <a:buFont typeface="+mj-lt"/>
+              <a:buAutoNum type="arabicPeriod"/>
+            </a:pPr>
+            <a:r>
+              <a:rPr lang="en-US" dirty="0"/>
+              <a:t>Copy from the drivers folder in the course GIT the PNG library into Arduino’s libraries folder</a:t>
+            </a:r>
+          </a:p>
+          <a:p>
+            <a:pPr marL="342900" indent="-342900">
+              <a:buFont typeface="+mj-lt"/>
+              <a:buAutoNum type="arabicPeriod"/>
+            </a:pPr>
+            <a:r>
+              <a:rPr lang="en-US" dirty="0"/>
+              <a:t>Copy the Setup300_MakersMiniPlatform_S3.h into the user setups folder within the </a:t>
+            </a:r>
+            <a:r>
+              <a:rPr lang="en-US" dirty="0" err="1"/>
+              <a:t>TFT_eSPI</a:t>
+            </a:r>
+            <a:r>
+              <a:rPr lang="en-US" dirty="0"/>
+              <a:t> library </a:t>
+            </a:r>
+          </a:p>
+          <a:p>
+            <a:pPr marL="342900" indent="-342900">
+              <a:buFont typeface="+mj-lt"/>
+              <a:buAutoNum type="arabicPeriod"/>
+            </a:pPr>
+            <a:r>
+              <a:rPr lang="en-US" dirty="0"/>
+              <a:t>From </a:t>
+            </a:r>
+            <a:r>
+              <a:rPr lang="en-US" b="1" dirty="0" err="1"/>
+              <a:t>CodeExamples</a:t>
+            </a:r>
+            <a:r>
+              <a:rPr lang="en-US" b="1" dirty="0"/>
+              <a:t>\</a:t>
+            </a:r>
+            <a:r>
+              <a:rPr lang="en-US" b="1" dirty="0" err="1"/>
+              <a:t>BasicProject</a:t>
+            </a:r>
+            <a:r>
+              <a:rPr lang="en-US" dirty="0"/>
+              <a:t> folder Copy the code from ESP32_S3_MP_BasicProject.ino onto your project</a:t>
+            </a:r>
+          </a:p>
+          <a:p>
+            <a:pPr marL="342900" indent="-342900">
+              <a:buFont typeface="+mj-lt"/>
+              <a:buAutoNum type="arabicPeriod"/>
+            </a:pPr>
+            <a:endParaRPr lang="en-US" dirty="0"/>
+          </a:p>
+          <a:p>
+            <a:pPr marL="342900" indent="-342900">
+              <a:buFont typeface="+mj-lt"/>
+              <a:buAutoNum type="arabicPeriod"/>
+            </a:pPr>
+            <a:endParaRPr lang="en-US" dirty="0"/>
           </a:p>
         </p:txBody>
       </p:sp>
@@ -16371,67 +16516,7 @@
           <p:cNvPr id="6" name="Picture 5">
             <a:extLst>
               <a:ext uri="{FF2B5EF4-FFF2-40B4-BE49-F238E27FC236}">
-                <a16:creationId xmlns:a16="http://schemas.microsoft.com/office/drawing/2014/main" id="{DC45A08D-9A66-884B-2D66-00A2483C684E}"/>
-              </a:ext>
-            </a:extLst>
-          </p:cNvPr>
-          <p:cNvPicPr>
-            <a:picLocks noChangeAspect="1"/>
-          </p:cNvPicPr>
-          <p:nvPr/>
-        </p:nvPicPr>
-        <p:blipFill>
-          <a:blip r:embed="rId2"/>
-          <a:stretch>
-            <a:fillRect/>
-          </a:stretch>
-        </p:blipFill>
-        <p:spPr>
-          <a:xfrm>
-            <a:off x="737882" y="1571477"/>
-            <a:ext cx="1022962" cy="828823"/>
-          </a:xfrm>
-          <a:prstGeom prst="rect">
-            <a:avLst/>
-          </a:prstGeom>
-        </p:spPr>
-      </p:pic>
-      <p:pic>
-        <p:nvPicPr>
-          <p:cNvPr id="8" name="Picture 7">
-            <a:extLst>
-              <a:ext uri="{FF2B5EF4-FFF2-40B4-BE49-F238E27FC236}">
-                <a16:creationId xmlns:a16="http://schemas.microsoft.com/office/drawing/2014/main" id="{4EE7EFE8-4EE2-1EB0-41AB-0EF91C9B3FA9}"/>
-              </a:ext>
-            </a:extLst>
-          </p:cNvPr>
-          <p:cNvPicPr>
-            <a:picLocks noChangeAspect="1"/>
-          </p:cNvPicPr>
-          <p:nvPr/>
-        </p:nvPicPr>
-        <p:blipFill>
-          <a:blip r:embed="rId3"/>
-          <a:stretch>
-            <a:fillRect/>
-          </a:stretch>
-        </p:blipFill>
-        <p:spPr>
-          <a:xfrm>
-            <a:off x="1995487" y="1448082"/>
-            <a:ext cx="2700693" cy="2599733"/>
-          </a:xfrm>
-          <a:prstGeom prst="rect">
-            <a:avLst/>
-          </a:prstGeom>
-        </p:spPr>
-      </p:pic>
-      <p:pic>
-        <p:nvPicPr>
-          <p:cNvPr id="10" name="Picture 9">
-            <a:extLst>
-              <a:ext uri="{FF2B5EF4-FFF2-40B4-BE49-F238E27FC236}">
-                <a16:creationId xmlns:a16="http://schemas.microsoft.com/office/drawing/2014/main" id="{76D69E42-557C-AC37-AFB2-284336D4AC31}"/>
+                <a16:creationId xmlns:a16="http://schemas.microsoft.com/office/drawing/2014/main" id="{73258B2E-60DC-9273-56E2-F8D40A22DF1C}"/>
               </a:ext>
             </a:extLst>
           </p:cNvPr>
@@ -16448,8 +16533,8 @@
         </p:blipFill>
         <p:spPr>
           <a:xfrm>
-            <a:off x="4756924" y="1623999"/>
-            <a:ext cx="3913582" cy="2247900"/>
+            <a:off x="6491286" y="398409"/>
+            <a:ext cx="2415061" cy="1784160"/>
           </a:xfrm>
           <a:prstGeom prst="rect">
             <a:avLst/>
@@ -16459,7 +16544,7 @@
     </p:spTree>
     <p:extLst>
       <p:ext uri="{BB962C8B-B14F-4D97-AF65-F5344CB8AC3E}">
-        <p14:creationId xmlns:p14="http://schemas.microsoft.com/office/powerpoint/2010/main" val="3986497912"/>
+        <p14:creationId xmlns:p14="http://schemas.microsoft.com/office/powerpoint/2010/main" val="1407571409"/>
       </p:ext>
     </p:extLst>
   </p:cSld>
@@ -16503,6 +16588,434 @@
           <p:cNvPr id="2" name="Slide Number Placeholder 1">
             <a:extLst>
               <a:ext uri="{FF2B5EF4-FFF2-40B4-BE49-F238E27FC236}">
+                <a16:creationId xmlns:a16="http://schemas.microsoft.com/office/drawing/2014/main" id="{6DDC3DC2-E1E0-4ADC-99B4-EC41F3605C53}"/>
+              </a:ext>
+            </a:extLst>
+          </p:cNvPr>
+          <p:cNvSpPr>
+            <a:spLocks noGrp="1"/>
+          </p:cNvSpPr>
+          <p:nvPr>
+            <p:ph type="sldNum" sz="quarter" idx="12"/>
+          </p:nvPr>
+        </p:nvSpPr>
+        <p:spPr/>
+        <p:txBody>
+          <a:bodyPr/>
+          <a:lstStyle/>
+          <a:p>
+            <a:fld id="{EE2556C5-CE8C-6547-B838-EA80C61A4AF7}" type="slidenum">
+              <a:rPr lang="en-US" smtClean="0"/>
+              <a:pPr/>
+              <a:t>21</a:t>
+            </a:fld>
+            <a:endParaRPr lang="en-US" dirty="0"/>
+          </a:p>
+        </p:txBody>
+      </p:sp>
+      <p:sp>
+        <p:nvSpPr>
+          <p:cNvPr id="3" name="Title 2">
+            <a:extLst>
+              <a:ext uri="{FF2B5EF4-FFF2-40B4-BE49-F238E27FC236}">
+                <a16:creationId xmlns:a16="http://schemas.microsoft.com/office/drawing/2014/main" id="{D9D845F4-3243-4A3A-BD6F-1EFC4D2546A2}"/>
+              </a:ext>
+            </a:extLst>
+          </p:cNvPr>
+          <p:cNvSpPr>
+            <a:spLocks noGrp="1"/>
+          </p:cNvSpPr>
+          <p:nvPr>
+            <p:ph type="title"/>
+          </p:nvPr>
+        </p:nvSpPr>
+        <p:spPr>
+          <a:xfrm>
+            <a:off x="455613" y="308848"/>
+            <a:ext cx="8229600" cy="342181"/>
+          </a:xfrm>
+        </p:spPr>
+        <p:txBody>
+          <a:bodyPr/>
+          <a:lstStyle/>
+          <a:p>
+            <a:r>
+              <a:rPr lang="en-US" dirty="0"/>
+              <a:t>How to use image files in our code</a:t>
+            </a:r>
+          </a:p>
+        </p:txBody>
+      </p:sp>
+      <p:sp>
+        <p:nvSpPr>
+          <p:cNvPr id="4" name="Content Placeholder 3">
+            <a:extLst>
+              <a:ext uri="{FF2B5EF4-FFF2-40B4-BE49-F238E27FC236}">
+                <a16:creationId xmlns:a16="http://schemas.microsoft.com/office/drawing/2014/main" id="{2D1D1002-C2B2-4C45-AA39-B9812A6839A7}"/>
+              </a:ext>
+            </a:extLst>
+          </p:cNvPr>
+          <p:cNvSpPr>
+            <a:spLocks noGrp="1"/>
+          </p:cNvSpPr>
+          <p:nvPr>
+            <p:ph sz="quarter" idx="13"/>
+          </p:nvPr>
+        </p:nvSpPr>
+        <p:spPr>
+          <a:xfrm>
+            <a:off x="455613" y="742765"/>
+            <a:ext cx="8228012" cy="3778927"/>
+          </a:xfrm>
+        </p:spPr>
+        <p:txBody>
+          <a:bodyPr/>
+          <a:lstStyle/>
+          <a:p>
+            <a:pPr marL="285750" indent="-285750">
+              <a:spcBef>
+                <a:spcPts val="600"/>
+              </a:spcBef>
+              <a:buFont typeface="Arial" panose="020B0604020202020204" pitchFamily="34" charset="0"/>
+              <a:buChar char="•"/>
+            </a:pPr>
+            <a:r>
+              <a:rPr lang="en-US" sz="1600" dirty="0"/>
+              <a:t>Download or create PNG files</a:t>
+            </a:r>
+          </a:p>
+          <a:p>
+            <a:pPr marL="285750" indent="-285750">
+              <a:spcBef>
+                <a:spcPts val="600"/>
+              </a:spcBef>
+              <a:buFont typeface="Arial" panose="020B0604020202020204" pitchFamily="34" charset="0"/>
+              <a:buChar char="•"/>
+            </a:pPr>
+            <a:r>
+              <a:rPr lang="en-US" sz="1600" dirty="0"/>
+              <a:t>Load them into the SD card</a:t>
+            </a:r>
+          </a:p>
+          <a:p>
+            <a:pPr marL="285750" indent="-285750">
+              <a:spcBef>
+                <a:spcPts val="600"/>
+              </a:spcBef>
+              <a:buFont typeface="Arial" panose="020B0604020202020204" pitchFamily="34" charset="0"/>
+              <a:buChar char="•"/>
+            </a:pPr>
+            <a:r>
+              <a:rPr lang="en-US" sz="1600" dirty="0"/>
+              <a:t>Load them into memory and then into the LCD or sprite</a:t>
+            </a:r>
+          </a:p>
+          <a:p>
+            <a:pPr marL="285750" indent="-285750">
+              <a:spcBef>
+                <a:spcPts val="600"/>
+              </a:spcBef>
+              <a:buFont typeface="Arial" panose="020B0604020202020204" pitchFamily="34" charset="0"/>
+              <a:buChar char="•"/>
+            </a:pPr>
+            <a:r>
+              <a:rPr lang="en-US" sz="1600" dirty="0"/>
+              <a:t>See the code example</a:t>
+            </a:r>
+          </a:p>
+        </p:txBody>
+      </p:sp>
+    </p:spTree>
+    <p:extLst>
+      <p:ext uri="{BB962C8B-B14F-4D97-AF65-F5344CB8AC3E}">
+        <p14:creationId xmlns:p14="http://schemas.microsoft.com/office/powerpoint/2010/main" val="2989656303"/>
+      </p:ext>
+    </p:extLst>
+  </p:cSld>
+  <p:clrMapOvr>
+    <a:masterClrMapping/>
+  </p:clrMapOvr>
+  <mc:AlternateContent xmlns:mc="http://schemas.openxmlformats.org/markup-compatibility/2006" xmlns:p14="http://schemas.microsoft.com/office/powerpoint/2010/main">
+    <mc:Choice Requires="p14">
+      <p:transition spd="med" p14:dur="700">
+        <p:fade/>
+      </p:transition>
+    </mc:Choice>
+    <mc:Fallback xmlns="">
+      <p:transition spd="med">
+        <p:fade/>
+      </p:transition>
+    </mc:Fallback>
+  </mc:AlternateContent>
+</p:sld>
+</file>
+
+<file path=ppt/slides/slide22.xml><?xml version="1.0" encoding="utf-8"?>
+<p:sld xmlns:a="http://schemas.openxmlformats.org/drawingml/2006/main" xmlns:r="http://schemas.openxmlformats.org/officeDocument/2006/relationships" xmlns:p="http://schemas.openxmlformats.org/presentationml/2006/main">
+  <p:cSld>
+    <p:spTree>
+      <p:nvGrpSpPr>
+        <p:cNvPr id="1" name=""/>
+        <p:cNvGrpSpPr/>
+        <p:nvPr/>
+      </p:nvGrpSpPr>
+      <p:grpSpPr>
+        <a:xfrm>
+          <a:off x="0" y="0"/>
+          <a:ext cx="0" cy="0"/>
+          <a:chOff x="0" y="0"/>
+          <a:chExt cx="0" cy="0"/>
+        </a:xfrm>
+      </p:grpSpPr>
+      <p:sp>
+        <p:nvSpPr>
+          <p:cNvPr id="2" name="Slide Number Placeholder 1">
+            <a:extLst>
+              <a:ext uri="{FF2B5EF4-FFF2-40B4-BE49-F238E27FC236}">
+                <a16:creationId xmlns:a16="http://schemas.microsoft.com/office/drawing/2014/main" id="{46E83D63-2998-4A61-C389-8701E936CDAF}"/>
+              </a:ext>
+            </a:extLst>
+          </p:cNvPr>
+          <p:cNvSpPr>
+            <a:spLocks noGrp="1"/>
+          </p:cNvSpPr>
+          <p:nvPr>
+            <p:ph type="sldNum" sz="quarter" idx="12"/>
+          </p:nvPr>
+        </p:nvSpPr>
+        <p:spPr/>
+        <p:txBody>
+          <a:bodyPr/>
+          <a:lstStyle/>
+          <a:p>
+            <a:fld id="{EE2556C5-CE8C-6547-B838-EA80C61A4AF7}" type="slidenum">
+              <a:rPr lang="en-US" smtClean="0"/>
+              <a:pPr/>
+              <a:t>22</a:t>
+            </a:fld>
+            <a:endParaRPr lang="en-US" dirty="0"/>
+          </a:p>
+        </p:txBody>
+      </p:sp>
+      <p:sp>
+        <p:nvSpPr>
+          <p:cNvPr id="3" name="Title 2">
+            <a:extLst>
+              <a:ext uri="{FF2B5EF4-FFF2-40B4-BE49-F238E27FC236}">
+                <a16:creationId xmlns:a16="http://schemas.microsoft.com/office/drawing/2014/main" id="{B6F9068D-B47B-354C-EF16-74C8B1C0C821}"/>
+              </a:ext>
+            </a:extLst>
+          </p:cNvPr>
+          <p:cNvSpPr>
+            <a:spLocks noGrp="1"/>
+          </p:cNvSpPr>
+          <p:nvPr>
+            <p:ph type="title"/>
+          </p:nvPr>
+        </p:nvSpPr>
+        <p:spPr>
+          <a:xfrm>
+            <a:off x="455613" y="308848"/>
+            <a:ext cx="8229600" cy="362665"/>
+          </a:xfrm>
+        </p:spPr>
+        <p:txBody>
+          <a:bodyPr/>
+          <a:lstStyle/>
+          <a:p>
+            <a:r>
+              <a:rPr lang="en-US" dirty="0"/>
+              <a:t>Extras:</a:t>
+            </a:r>
+            <a:endParaRPr lang="en-IL" dirty="0"/>
+          </a:p>
+        </p:txBody>
+      </p:sp>
+      <p:sp>
+        <p:nvSpPr>
+          <p:cNvPr id="4" name="Content Placeholder 3">
+            <a:extLst>
+              <a:ext uri="{FF2B5EF4-FFF2-40B4-BE49-F238E27FC236}">
+                <a16:creationId xmlns:a16="http://schemas.microsoft.com/office/drawing/2014/main" id="{8B6446D1-2A03-DF68-1DF4-D9D0C090C5DF}"/>
+              </a:ext>
+            </a:extLst>
+          </p:cNvPr>
+          <p:cNvSpPr>
+            <a:spLocks noGrp="1"/>
+          </p:cNvSpPr>
+          <p:nvPr>
+            <p:ph sz="quarter" idx="13"/>
+          </p:nvPr>
+        </p:nvSpPr>
+        <p:spPr>
+          <a:xfrm>
+            <a:off x="455613" y="671513"/>
+            <a:ext cx="8228012" cy="3957637"/>
+          </a:xfrm>
+        </p:spPr>
+        <p:txBody>
+          <a:bodyPr/>
+          <a:lstStyle/>
+          <a:p>
+            <a:pPr marL="285750" indent="-285750">
+              <a:buFont typeface="Arial" panose="020B0604020202020204" pitchFamily="34" charset="0"/>
+              <a:buChar char="•"/>
+            </a:pPr>
+            <a:r>
+              <a:rPr lang="en-US" dirty="0"/>
+              <a:t>How to load bin directly using web interface: </a:t>
+            </a:r>
+          </a:p>
+          <a:p>
+            <a:pPr marL="511175" lvl="1" indent="-285750">
+              <a:buFont typeface="Arial" panose="020B0604020202020204" pitchFamily="34" charset="0"/>
+              <a:buChar char="•"/>
+            </a:pPr>
+            <a:r>
+              <a:rPr lang="en-US" dirty="0"/>
+              <a:t>https://espressif.github.io/esptool-js/</a:t>
+            </a:r>
+            <a:endParaRPr lang="en-IL" dirty="0"/>
+          </a:p>
+        </p:txBody>
+      </p:sp>
+      <p:pic>
+        <p:nvPicPr>
+          <p:cNvPr id="6" name="Picture 5">
+            <a:extLst>
+              <a:ext uri="{FF2B5EF4-FFF2-40B4-BE49-F238E27FC236}">
+                <a16:creationId xmlns:a16="http://schemas.microsoft.com/office/drawing/2014/main" id="{DC45A08D-9A66-884B-2D66-00A2483C684E}"/>
+              </a:ext>
+            </a:extLst>
+          </p:cNvPr>
+          <p:cNvPicPr>
+            <a:picLocks noChangeAspect="1"/>
+          </p:cNvPicPr>
+          <p:nvPr/>
+        </p:nvPicPr>
+        <p:blipFill>
+          <a:blip r:embed="rId2"/>
+          <a:stretch>
+            <a:fillRect/>
+          </a:stretch>
+        </p:blipFill>
+        <p:spPr>
+          <a:xfrm>
+            <a:off x="737882" y="1571477"/>
+            <a:ext cx="1022962" cy="828823"/>
+          </a:xfrm>
+          <a:prstGeom prst="rect">
+            <a:avLst/>
+          </a:prstGeom>
+        </p:spPr>
+      </p:pic>
+      <p:pic>
+        <p:nvPicPr>
+          <p:cNvPr id="8" name="Picture 7">
+            <a:extLst>
+              <a:ext uri="{FF2B5EF4-FFF2-40B4-BE49-F238E27FC236}">
+                <a16:creationId xmlns:a16="http://schemas.microsoft.com/office/drawing/2014/main" id="{4EE7EFE8-4EE2-1EB0-41AB-0EF91C9B3FA9}"/>
+              </a:ext>
+            </a:extLst>
+          </p:cNvPr>
+          <p:cNvPicPr>
+            <a:picLocks noChangeAspect="1"/>
+          </p:cNvPicPr>
+          <p:nvPr/>
+        </p:nvPicPr>
+        <p:blipFill>
+          <a:blip r:embed="rId3"/>
+          <a:stretch>
+            <a:fillRect/>
+          </a:stretch>
+        </p:blipFill>
+        <p:spPr>
+          <a:xfrm>
+            <a:off x="1995487" y="1448082"/>
+            <a:ext cx="2700693" cy="2599733"/>
+          </a:xfrm>
+          <a:prstGeom prst="rect">
+            <a:avLst/>
+          </a:prstGeom>
+        </p:spPr>
+      </p:pic>
+      <p:pic>
+        <p:nvPicPr>
+          <p:cNvPr id="10" name="Picture 9">
+            <a:extLst>
+              <a:ext uri="{FF2B5EF4-FFF2-40B4-BE49-F238E27FC236}">
+                <a16:creationId xmlns:a16="http://schemas.microsoft.com/office/drawing/2014/main" id="{76D69E42-557C-AC37-AFB2-284336D4AC31}"/>
+              </a:ext>
+            </a:extLst>
+          </p:cNvPr>
+          <p:cNvPicPr>
+            <a:picLocks noChangeAspect="1"/>
+          </p:cNvPicPr>
+          <p:nvPr/>
+        </p:nvPicPr>
+        <p:blipFill>
+          <a:blip r:embed="rId4"/>
+          <a:stretch>
+            <a:fillRect/>
+          </a:stretch>
+        </p:blipFill>
+        <p:spPr>
+          <a:xfrm>
+            <a:off x="4756924" y="1623999"/>
+            <a:ext cx="3913582" cy="2247900"/>
+          </a:xfrm>
+          <a:prstGeom prst="rect">
+            <a:avLst/>
+          </a:prstGeom>
+        </p:spPr>
+      </p:pic>
+    </p:spTree>
+    <p:extLst>
+      <p:ext uri="{BB962C8B-B14F-4D97-AF65-F5344CB8AC3E}">
+        <p14:creationId xmlns:p14="http://schemas.microsoft.com/office/powerpoint/2010/main" val="3986497912"/>
+      </p:ext>
+    </p:extLst>
+  </p:cSld>
+  <p:clrMapOvr>
+    <a:masterClrMapping/>
+  </p:clrMapOvr>
+  <mc:AlternateContent xmlns:mc="http://schemas.openxmlformats.org/markup-compatibility/2006" xmlns:p14="http://schemas.microsoft.com/office/powerpoint/2010/main">
+    <mc:Choice Requires="p14">
+      <p:transition spd="med" p14:dur="700">
+        <p:fade/>
+      </p:transition>
+    </mc:Choice>
+    <mc:Fallback xmlns="">
+      <p:transition spd="med">
+        <p:fade/>
+      </p:transition>
+    </mc:Fallback>
+  </mc:AlternateContent>
+</p:sld>
+</file>
+
+<file path=ppt/slides/slide23.xml><?xml version="1.0" encoding="utf-8"?>
+<p:sld xmlns:a="http://schemas.openxmlformats.org/drawingml/2006/main" xmlns:r="http://schemas.openxmlformats.org/officeDocument/2006/relationships" xmlns:p="http://schemas.openxmlformats.org/presentationml/2006/main">
+  <p:cSld>
+    <p:spTree>
+      <p:nvGrpSpPr>
+        <p:cNvPr id="1" name=""/>
+        <p:cNvGrpSpPr/>
+        <p:nvPr/>
+      </p:nvGrpSpPr>
+      <p:grpSpPr>
+        <a:xfrm>
+          <a:off x="0" y="0"/>
+          <a:ext cx="0" cy="0"/>
+          <a:chOff x="0" y="0"/>
+          <a:chExt cx="0" cy="0"/>
+        </a:xfrm>
+      </p:grpSpPr>
+      <p:sp>
+        <p:nvSpPr>
+          <p:cNvPr id="2" name="Slide Number Placeholder 1">
+            <a:extLst>
+              <a:ext uri="{FF2B5EF4-FFF2-40B4-BE49-F238E27FC236}">
                 <a16:creationId xmlns:a16="http://schemas.microsoft.com/office/drawing/2014/main" id="{2AC40DE2-95C9-6321-E30B-BEC81FAA61F7}"/>
               </a:ext>
             </a:extLst>
@@ -16522,7 +17035,7 @@
             <a:fld id="{EE2556C5-CE8C-6547-B838-EA80C61A4AF7}" type="slidenum">
               <a:rPr lang="en-US" smtClean="0"/>
               <a:pPr/>
-              <a:t>21</a:t>
+              <a:t>23</a:t>
             </a:fld>
             <a:endParaRPr lang="en-US" dirty="0"/>
           </a:p>
@@ -16656,7 +17169,7 @@
 </p:sld>
 </file>
 
-<file path=ppt/slides/slide22.xml><?xml version="1.0" encoding="utf-8"?>
+<file path=ppt/slides/slide24.xml><?xml version="1.0" encoding="utf-8"?>
 <p:sld xmlns:a="http://schemas.openxmlformats.org/drawingml/2006/main" xmlns:r="http://schemas.openxmlformats.org/officeDocument/2006/relationships" xmlns:p="http://schemas.openxmlformats.org/presentationml/2006/main">
   <p:cSld>
     <p:spTree>
@@ -16763,7 +17276,7 @@
         </p:nvSpPr>
         <p:spPr>
           <a:xfrm>
-            <a:off x="455613" y="308848"/>
+            <a:off x="454025" y="214640"/>
             <a:ext cx="8229600" cy="386447"/>
           </a:xfrm>
         </p:spPr>
@@ -16796,7 +17309,7 @@
         </p:nvSpPr>
         <p:spPr>
           <a:xfrm>
-            <a:off x="455613" y="721588"/>
+            <a:off x="454025" y="608300"/>
             <a:ext cx="8228012" cy="3982298"/>
           </a:xfrm>
         </p:spPr>
@@ -16933,7 +17446,20 @@
             </a:pPr>
             <a:r>
               <a:rPr lang="en-US" sz="1600" dirty="0"/>
-              <a:t>Two main technics </a:t>
+              <a:t>Two main technics</a:t>
+            </a:r>
+          </a:p>
+          <a:p>
+            <a:pPr marL="396875" lvl="1" indent="-171450">
+              <a:spcBef>
+                <a:spcPts val="600"/>
+              </a:spcBef>
+              <a:buFont typeface="Arial" panose="020B0604020202020204" pitchFamily="34" charset="0"/>
+              <a:buChar char="•"/>
+            </a:pPr>
+            <a:r>
+              <a:rPr lang="en-US" sz="1600" dirty="0"/>
+              <a:t>Loading custom fonts </a:t>
             </a:r>
           </a:p>
           <a:p>

</xml_diff>